<commit_message>
fixed report and presentation
</commit_message>
<xml_diff>
--- a/PD1_Prezentacija_Rulevics.pptx
+++ b/PD1_Prezentacija_Rulevics.pptx
@@ -9,6 +9,8 @@
     <p:sldId id="257" r:id="rId3"/>
     <p:sldId id="258" r:id="rId4"/>
     <p:sldId id="259" r:id="rId5"/>
+    <p:sldId id="260" r:id="rId6"/>
+    <p:sldId id="261" r:id="rId7"/>
   </p:sldIdLst>
   <p:sldSz cx="12192000" cy="6858000"/>
   <p:notesSz cx="6858000" cy="9144000"/>
@@ -107,6 +109,11 @@
       </a:defRPr>
     </a:lvl9pPr>
   </p:defaultTextStyle>
+  <p:extLst>
+    <p:ext uri="{EFAFB233-063F-42B5-8137-9DF3F51BA10A}">
+      <p15:sldGuideLst xmlns:p15="http://schemas.microsoft.com/office/powerpoint/2012/main"/>
+    </p:ext>
+  </p:extLst>
 </p:presentation>
 </file>
 
@@ -3915,7 +3922,7 @@
         </p:spPr>
         <p:txBody>
           <a:bodyPr>
-            <a:normAutofit fontScale="90000"/>
+            <a:normAutofit/>
           </a:bodyPr>
           <a:lstStyle/>
           <a:p>
@@ -5174,7 +5181,7 @@
         </p:spPr>
         <p:txBody>
           <a:bodyPr>
-            <a:normAutofit fontScale="90000"/>
+            <a:normAutofit/>
           </a:bodyPr>
           <a:lstStyle/>
           <a:p>
@@ -5229,7 +5236,7 @@
         </p:nvSpPr>
         <p:spPr>
           <a:xfrm>
-            <a:off x="5291667" y="1598189"/>
+            <a:off x="372533" y="1394989"/>
             <a:ext cx="5240865" cy="5022426"/>
           </a:xfrm>
         </p:spPr>
@@ -5250,6 +5257,218 @@
     <p:extLst>
       <p:ext uri="{BB962C8B-B14F-4D97-AF65-F5344CB8AC3E}">
         <p14:creationId xmlns:p14="http://schemas.microsoft.com/office/powerpoint/2010/main" val="3402028415"/>
+      </p:ext>
+    </p:extLst>
+  </p:cSld>
+  <p:clrMapOvr>
+    <a:masterClrMapping/>
+  </p:clrMapOvr>
+</p:sld>
+</file>
+
+<file path=ppt/slides/slide5.xml><?xml version="1.0" encoding="utf-8"?>
+<p:sld xmlns:a="http://schemas.openxmlformats.org/drawingml/2006/main" xmlns:r="http://schemas.openxmlformats.org/officeDocument/2006/relationships" xmlns:p="http://schemas.openxmlformats.org/presentationml/2006/main">
+  <p:cSld>
+    <p:spTree>
+      <p:nvGrpSpPr>
+        <p:cNvPr id="1" name=""/>
+        <p:cNvGrpSpPr/>
+        <p:nvPr/>
+      </p:nvGrpSpPr>
+      <p:grpSpPr>
+        <a:xfrm>
+          <a:off x="0" y="0"/>
+          <a:ext cx="0" cy="0"/>
+          <a:chOff x="0" y="0"/>
+          <a:chExt cx="0" cy="0"/>
+        </a:xfrm>
+      </p:grpSpPr>
+      <p:sp>
+        <p:nvSpPr>
+          <p:cNvPr id="2" name="Заголовок 1">
+            <a:extLst>
+              <a:ext uri="{FF2B5EF4-FFF2-40B4-BE49-F238E27FC236}">
+                <a16:creationId xmlns:a16="http://schemas.microsoft.com/office/drawing/2014/main" id="{BAA9CF46-B519-4275-A267-75A74DE5D2A9}"/>
+              </a:ext>
+            </a:extLst>
+          </p:cNvPr>
+          <p:cNvSpPr>
+            <a:spLocks noGrp="1"/>
+          </p:cNvSpPr>
+          <p:nvPr>
+            <p:ph type="title"/>
+          </p:nvPr>
+        </p:nvSpPr>
+        <p:spPr>
+          <a:xfrm>
+            <a:off x="372533" y="0"/>
+            <a:ext cx="10888134" cy="1394989"/>
+          </a:xfrm>
+        </p:spPr>
+        <p:txBody>
+          <a:bodyPr>
+            <a:normAutofit/>
+          </a:bodyPr>
+          <a:lstStyle/>
+          <a:p>
+            <a:r>
+              <a:rPr lang="lv-LV" sz="5400" b="1" dirty="0">
+                <a:solidFill>
+                  <a:schemeClr val="accent1">
+                    <a:lumMod val="50000"/>
+                  </a:schemeClr>
+                </a:solidFill>
+              </a:rPr>
+              <a:t>Klašu diagramma</a:t>
+            </a:r>
+          </a:p>
+        </p:txBody>
+      </p:sp>
+      <p:sp>
+        <p:nvSpPr>
+          <p:cNvPr id="3" name="Объект 2">
+            <a:extLst>
+              <a:ext uri="{FF2B5EF4-FFF2-40B4-BE49-F238E27FC236}">
+                <a16:creationId xmlns:a16="http://schemas.microsoft.com/office/drawing/2014/main" id="{C6D24479-1A15-455E-9662-E2A3D71266E7}"/>
+              </a:ext>
+            </a:extLst>
+          </p:cNvPr>
+          <p:cNvSpPr>
+            <a:spLocks noGrp="1"/>
+          </p:cNvSpPr>
+          <p:nvPr>
+            <p:ph idx="1"/>
+          </p:nvPr>
+        </p:nvSpPr>
+        <p:spPr>
+          <a:xfrm>
+            <a:off x="372533" y="1394989"/>
+            <a:ext cx="5240865" cy="5022426"/>
+          </a:xfrm>
+        </p:spPr>
+        <p:txBody>
+          <a:bodyPr>
+            <a:noAutofit/>
+          </a:bodyPr>
+          <a:lstStyle/>
+          <a:p>
+            <a:pPr marL="0" indent="0">
+              <a:buNone/>
+            </a:pPr>
+            <a:endParaRPr lang="ru-RU" sz="2400" dirty="0"/>
+          </a:p>
+        </p:txBody>
+      </p:sp>
+    </p:spTree>
+    <p:extLst>
+      <p:ext uri="{BB962C8B-B14F-4D97-AF65-F5344CB8AC3E}">
+        <p14:creationId xmlns:p14="http://schemas.microsoft.com/office/powerpoint/2010/main" val="2699691408"/>
+      </p:ext>
+    </p:extLst>
+  </p:cSld>
+  <p:clrMapOvr>
+    <a:masterClrMapping/>
+  </p:clrMapOvr>
+</p:sld>
+</file>
+
+<file path=ppt/slides/slide6.xml><?xml version="1.0" encoding="utf-8"?>
+<p:sld xmlns:a="http://schemas.openxmlformats.org/drawingml/2006/main" xmlns:r="http://schemas.openxmlformats.org/officeDocument/2006/relationships" xmlns:p="http://schemas.openxmlformats.org/presentationml/2006/main">
+  <p:cSld>
+    <p:spTree>
+      <p:nvGrpSpPr>
+        <p:cNvPr id="1" name=""/>
+        <p:cNvGrpSpPr/>
+        <p:nvPr/>
+      </p:nvGrpSpPr>
+      <p:grpSpPr>
+        <a:xfrm>
+          <a:off x="0" y="0"/>
+          <a:ext cx="0" cy="0"/>
+          <a:chOff x="0" y="0"/>
+          <a:chExt cx="0" cy="0"/>
+        </a:xfrm>
+      </p:grpSpPr>
+      <p:sp>
+        <p:nvSpPr>
+          <p:cNvPr id="2" name="Заголовок 1">
+            <a:extLst>
+              <a:ext uri="{FF2B5EF4-FFF2-40B4-BE49-F238E27FC236}">
+                <a16:creationId xmlns:a16="http://schemas.microsoft.com/office/drawing/2014/main" id="{BAA9CF46-B519-4275-A267-75A74DE5D2A9}"/>
+              </a:ext>
+            </a:extLst>
+          </p:cNvPr>
+          <p:cNvSpPr>
+            <a:spLocks noGrp="1"/>
+          </p:cNvSpPr>
+          <p:nvPr>
+            <p:ph type="title"/>
+          </p:nvPr>
+        </p:nvSpPr>
+        <p:spPr>
+          <a:xfrm>
+            <a:off x="372533" y="0"/>
+            <a:ext cx="10888134" cy="1394989"/>
+          </a:xfrm>
+        </p:spPr>
+        <p:txBody>
+          <a:bodyPr>
+            <a:normAutofit fontScale="90000"/>
+          </a:bodyPr>
+          <a:lstStyle/>
+          <a:p>
+            <a:r>
+              <a:rPr lang="lv-LV" sz="5400" b="1" dirty="0">
+                <a:solidFill>
+                  <a:schemeClr val="accent1">
+                    <a:lumMod val="50000"/>
+                  </a:schemeClr>
+                </a:solidFill>
+              </a:rPr>
+              <a:t>Galveno metožu algoritmu apraksts</a:t>
+            </a:r>
+          </a:p>
+        </p:txBody>
+      </p:sp>
+      <p:sp>
+        <p:nvSpPr>
+          <p:cNvPr id="3" name="Объект 2">
+            <a:extLst>
+              <a:ext uri="{FF2B5EF4-FFF2-40B4-BE49-F238E27FC236}">
+                <a16:creationId xmlns:a16="http://schemas.microsoft.com/office/drawing/2014/main" id="{C6D24479-1A15-455E-9662-E2A3D71266E7}"/>
+              </a:ext>
+            </a:extLst>
+          </p:cNvPr>
+          <p:cNvSpPr>
+            <a:spLocks noGrp="1"/>
+          </p:cNvSpPr>
+          <p:nvPr>
+            <p:ph idx="1"/>
+          </p:nvPr>
+        </p:nvSpPr>
+        <p:spPr>
+          <a:xfrm>
+            <a:off x="372533" y="1394989"/>
+            <a:ext cx="5240865" cy="5022426"/>
+          </a:xfrm>
+        </p:spPr>
+        <p:txBody>
+          <a:bodyPr>
+            <a:noAutofit/>
+          </a:bodyPr>
+          <a:lstStyle/>
+          <a:p>
+            <a:pPr marL="0" indent="0">
+              <a:buNone/>
+            </a:pPr>
+            <a:endParaRPr lang="ru-RU" sz="2400" dirty="0"/>
+          </a:p>
+        </p:txBody>
+      </p:sp>
+    </p:spTree>
+    <p:extLst>
+      <p:ext uri="{BB962C8B-B14F-4D97-AF65-F5344CB8AC3E}">
+        <p14:creationId xmlns:p14="http://schemas.microsoft.com/office/powerpoint/2010/main" val="4281422614"/>
       </p:ext>
     </p:extLst>
   </p:cSld>
@@ -5300,76 +5519,16 @@
         <a:srgbClr val="BA6906"/>
       </a:folHlink>
     </a:clrScheme>
-    <a:fontScheme name="Вид">
+    <a:fontScheme name="Cambria">
       <a:majorFont>
-        <a:latin typeface="Century Schoolbook" panose="02040604050505020304"/>
+        <a:latin typeface="Cambria"/>
         <a:ea typeface=""/>
         <a:cs typeface=""/>
-        <a:font script="Jpan" typeface="ＭＳ ゴシック"/>
-        <a:font script="Hang" typeface="맑은 고딕"/>
-        <a:font script="Hans" typeface="宋体"/>
-        <a:font script="Hant" typeface="新細明體"/>
-        <a:font script="Arab" typeface="Tahoma"/>
-        <a:font script="Hebr" typeface="Gisha"/>
-        <a:font script="Thai" typeface="DilleniaUPC"/>
-        <a:font script="Ethi" typeface="Nyala"/>
-        <a:font script="Beng" typeface="Vrinda"/>
-        <a:font script="Gujr" typeface="Shruti"/>
-        <a:font script="Khmr" typeface="DaunPenh"/>
-        <a:font script="Knda" typeface="Tunga"/>
-        <a:font script="Guru" typeface="Raavi"/>
-        <a:font script="Cans" typeface="Euphemia"/>
-        <a:font script="Cher" typeface="Plantagenet Cherokee"/>
-        <a:font script="Yiii" typeface="Microsoft Yi Baiti"/>
-        <a:font script="Tibt" typeface="Microsoft Himalaya"/>
-        <a:font script="Thaa" typeface="MV Boli"/>
-        <a:font script="Deva" typeface="Mangal"/>
-        <a:font script="Telu" typeface="Gautami"/>
-        <a:font script="Taml" typeface="Latha"/>
-        <a:font script="Syrc" typeface="Estrangelo Edessa"/>
-        <a:font script="Orya" typeface="Kalinga"/>
-        <a:font script="Mlym" typeface="Kartika"/>
-        <a:font script="Laoo" typeface="DokChampa"/>
-        <a:font script="Sinh" typeface="Iskoola Pota"/>
-        <a:font script="Mong" typeface="Mongolian Baiti"/>
-        <a:font script="Viet" typeface="Tahoma"/>
-        <a:font script="Uigh" typeface="Microsoft Uighur"/>
-        <a:font script="Geor" typeface="Sylfaen"/>
       </a:majorFont>
       <a:minorFont>
-        <a:latin typeface="Century Schoolbook" panose="02040604050505020304"/>
+        <a:latin typeface="Cambria"/>
         <a:ea typeface=""/>
         <a:cs typeface=""/>
-        <a:font script="Jpan" typeface="ＭＳ ゴシック"/>
-        <a:font script="Hang" typeface="맑은 고딕"/>
-        <a:font script="Hans" typeface="宋体"/>
-        <a:font script="Hant" typeface="新細明體"/>
-        <a:font script="Arab" typeface="Tahoma"/>
-        <a:font script="Hebr" typeface="Gisha"/>
-        <a:font script="Thai" typeface="DilleniaUPC"/>
-        <a:font script="Ethi" typeface="Nyala"/>
-        <a:font script="Beng" typeface="Vrinda"/>
-        <a:font script="Gujr" typeface="Shruti"/>
-        <a:font script="Khmr" typeface="DaunPenh"/>
-        <a:font script="Knda" typeface="Tunga"/>
-        <a:font script="Guru" typeface="Raavi"/>
-        <a:font script="Cans" typeface="Euphemia"/>
-        <a:font script="Cher" typeface="Plantagenet Cherokee"/>
-        <a:font script="Yiii" typeface="Microsoft Yi Baiti"/>
-        <a:font script="Tibt" typeface="Microsoft Himalaya"/>
-        <a:font script="Thaa" typeface="MV Boli"/>
-        <a:font script="Deva" typeface="Mangal"/>
-        <a:font script="Telu" typeface="Gautami"/>
-        <a:font script="Taml" typeface="Latha"/>
-        <a:font script="Syrc" typeface="Estrangelo Edessa"/>
-        <a:font script="Orya" typeface="Kalinga"/>
-        <a:font script="Mlym" typeface="Kartika"/>
-        <a:font script="Laoo" typeface="DokChampa"/>
-        <a:font script="Sinh" typeface="Iskoola Pota"/>
-        <a:font script="Mong" typeface="Mongolian Baiti"/>
-        <a:font script="Viet" typeface="Verdana"/>
-        <a:font script="Uigh" typeface="Microsoft Uighur"/>
-        <a:font script="Geor" typeface="Sylfaen"/>
       </a:minorFont>
     </a:fontScheme>
     <a:fmtScheme name="Вид">

</xml_diff>

<commit_message>
added some new tests and supplemented the presentation
</commit_message>
<xml_diff>
--- a/PD1_Prezentacija_Rulevics.pptx
+++ b/PD1_Prezentacija_Rulevics.pptx
@@ -10,7 +10,14 @@
     <p:sldId id="258" r:id="rId4"/>
     <p:sldId id="259" r:id="rId5"/>
     <p:sldId id="260" r:id="rId6"/>
-    <p:sldId id="261" r:id="rId7"/>
+    <p:sldId id="263" r:id="rId7"/>
+    <p:sldId id="261" r:id="rId8"/>
+    <p:sldId id="262" r:id="rId9"/>
+    <p:sldId id="264" r:id="rId10"/>
+    <p:sldId id="265" r:id="rId11"/>
+    <p:sldId id="267" r:id="rId12"/>
+    <p:sldId id="268" r:id="rId13"/>
+    <p:sldId id="266" r:id="rId14"/>
   </p:sldIdLst>
   <p:sldSz cx="12192000" cy="6858000"/>
   <p:notesSz cx="6858000" cy="9144000"/>
@@ -285,7 +292,7 @@
           <a:p>
             <a:fld id="{D5C595D4-6FE0-4278-BD8F-AAAD6187BF56}" type="datetimeFigureOut">
               <a:rPr lang="ru-RU" smtClean="0"/>
-              <a:t>13.06.2024</a:t>
+              <a:t>15.06.2024</a:t>
             </a:fld>
             <a:endParaRPr lang="ru-RU"/>
           </a:p>
@@ -513,7 +520,7 @@
           <a:p>
             <a:fld id="{D5C595D4-6FE0-4278-BD8F-AAAD6187BF56}" type="datetimeFigureOut">
               <a:rPr lang="ru-RU" smtClean="0"/>
-              <a:t>13.06.2024</a:t>
+              <a:t>15.06.2024</a:t>
             </a:fld>
             <a:endParaRPr lang="ru-RU"/>
           </a:p>
@@ -693,7 +700,7 @@
           <a:p>
             <a:fld id="{D5C595D4-6FE0-4278-BD8F-AAAD6187BF56}" type="datetimeFigureOut">
               <a:rPr lang="ru-RU" smtClean="0"/>
-              <a:t>13.06.2024</a:t>
+              <a:t>15.06.2024</a:t>
             </a:fld>
             <a:endParaRPr lang="ru-RU"/>
           </a:p>
@@ -863,7 +870,7 @@
           <a:p>
             <a:fld id="{D5C595D4-6FE0-4278-BD8F-AAAD6187BF56}" type="datetimeFigureOut">
               <a:rPr lang="ru-RU" smtClean="0"/>
-              <a:t>13.06.2024</a:t>
+              <a:t>15.06.2024</a:t>
             </a:fld>
             <a:endParaRPr lang="ru-RU"/>
           </a:p>
@@ -1117,7 +1124,7 @@
           <a:p>
             <a:fld id="{D5C595D4-6FE0-4278-BD8F-AAAD6187BF56}" type="datetimeFigureOut">
               <a:rPr lang="ru-RU" smtClean="0"/>
-              <a:t>13.06.2024</a:t>
+              <a:t>15.06.2024</a:t>
             </a:fld>
             <a:endParaRPr lang="ru-RU"/>
           </a:p>
@@ -1443,7 +1450,7 @@
           <a:p>
             <a:fld id="{D5C595D4-6FE0-4278-BD8F-AAAD6187BF56}" type="datetimeFigureOut">
               <a:rPr lang="ru-RU" smtClean="0"/>
-              <a:t>13.06.2024</a:t>
+              <a:t>15.06.2024</a:t>
             </a:fld>
             <a:endParaRPr lang="ru-RU"/>
           </a:p>
@@ -1894,7 +1901,7 @@
           <a:p>
             <a:fld id="{D5C595D4-6FE0-4278-BD8F-AAAD6187BF56}" type="datetimeFigureOut">
               <a:rPr lang="ru-RU" smtClean="0"/>
-              <a:t>13.06.2024</a:t>
+              <a:t>15.06.2024</a:t>
             </a:fld>
             <a:endParaRPr lang="ru-RU"/>
           </a:p>
@@ -2012,7 +2019,7 @@
           <a:p>
             <a:fld id="{D5C595D4-6FE0-4278-BD8F-AAAD6187BF56}" type="datetimeFigureOut">
               <a:rPr lang="ru-RU" smtClean="0"/>
-              <a:t>13.06.2024</a:t>
+              <a:t>15.06.2024</a:t>
             </a:fld>
             <a:endParaRPr lang="ru-RU"/>
           </a:p>
@@ -2107,7 +2114,7 @@
           <a:p>
             <a:fld id="{D5C595D4-6FE0-4278-BD8F-AAAD6187BF56}" type="datetimeFigureOut">
               <a:rPr lang="ru-RU" smtClean="0"/>
-              <a:t>13.06.2024</a:t>
+              <a:t>15.06.2024</a:t>
             </a:fld>
             <a:endParaRPr lang="ru-RU"/>
           </a:p>
@@ -2394,7 +2401,7 @@
           <a:p>
             <a:fld id="{D5C595D4-6FE0-4278-BD8F-AAAD6187BF56}" type="datetimeFigureOut">
               <a:rPr lang="ru-RU" smtClean="0"/>
-              <a:t>13.06.2024</a:t>
+              <a:t>15.06.2024</a:t>
             </a:fld>
             <a:endParaRPr lang="ru-RU"/>
           </a:p>
@@ -2716,7 +2723,7 @@
           <a:p>
             <a:fld id="{D5C595D4-6FE0-4278-BD8F-AAAD6187BF56}" type="datetimeFigureOut">
               <a:rPr lang="ru-RU" smtClean="0"/>
-              <a:t>13.06.2024</a:t>
+              <a:t>15.06.2024</a:t>
             </a:fld>
             <a:endParaRPr lang="ru-RU"/>
           </a:p>
@@ -2970,7 +2977,7 @@
           <a:p>
             <a:fld id="{D5C595D4-6FE0-4278-BD8F-AAAD6187BF56}" type="datetimeFigureOut">
               <a:rPr lang="ru-RU" smtClean="0"/>
-              <a:t>13.06.2024</a:t>
+              <a:t>15.06.2024</a:t>
             </a:fld>
             <a:endParaRPr lang="ru-RU"/>
           </a:p>
@@ -3533,6 +3540,390 @@
 </p:sld>
 </file>
 
+<file path=ppt/slides/slide10.xml><?xml version="1.0" encoding="utf-8"?>
+<p:sld xmlns:a="http://schemas.openxmlformats.org/drawingml/2006/main" xmlns:r="http://schemas.openxmlformats.org/officeDocument/2006/relationships" xmlns:p="http://schemas.openxmlformats.org/presentationml/2006/main">
+  <p:cSld>
+    <p:spTree>
+      <p:nvGrpSpPr>
+        <p:cNvPr id="1" name=""/>
+        <p:cNvGrpSpPr/>
+        <p:nvPr/>
+      </p:nvGrpSpPr>
+      <p:grpSpPr>
+        <a:xfrm>
+          <a:off x="0" y="0"/>
+          <a:ext cx="0" cy="0"/>
+          <a:chOff x="0" y="0"/>
+          <a:chExt cx="0" cy="0"/>
+        </a:xfrm>
+      </p:grpSpPr>
+      <p:sp>
+        <p:nvSpPr>
+          <p:cNvPr id="2" name="Заголовок 1">
+            <a:extLst>
+              <a:ext uri="{FF2B5EF4-FFF2-40B4-BE49-F238E27FC236}">
+                <a16:creationId xmlns:a16="http://schemas.microsoft.com/office/drawing/2014/main" id="{BAA9CF46-B519-4275-A267-75A74DE5D2A9}"/>
+              </a:ext>
+            </a:extLst>
+          </p:cNvPr>
+          <p:cNvSpPr>
+            <a:spLocks noGrp="1"/>
+          </p:cNvSpPr>
+          <p:nvPr>
+            <p:ph type="title"/>
+          </p:nvPr>
+        </p:nvSpPr>
+        <p:spPr>
+          <a:xfrm>
+            <a:off x="372533" y="0"/>
+            <a:ext cx="10888134" cy="1394989"/>
+          </a:xfrm>
+        </p:spPr>
+        <p:txBody>
+          <a:bodyPr>
+            <a:normAutofit/>
+          </a:bodyPr>
+          <a:lstStyle/>
+          <a:p>
+            <a:r>
+              <a:rPr lang="lv-LV" sz="5400" b="1" dirty="0">
+                <a:solidFill>
+                  <a:schemeClr val="accent1">
+                    <a:lumMod val="50000"/>
+                  </a:schemeClr>
+                </a:solidFill>
+              </a:rPr>
+              <a:t>Testēšanas apraksts</a:t>
+            </a:r>
+          </a:p>
+        </p:txBody>
+      </p:sp>
+      <p:sp>
+        <p:nvSpPr>
+          <p:cNvPr id="3" name="Объект 2">
+            <a:extLst>
+              <a:ext uri="{FF2B5EF4-FFF2-40B4-BE49-F238E27FC236}">
+                <a16:creationId xmlns:a16="http://schemas.microsoft.com/office/drawing/2014/main" id="{C6D24479-1A15-455E-9662-E2A3D71266E7}"/>
+              </a:ext>
+            </a:extLst>
+          </p:cNvPr>
+          <p:cNvSpPr>
+            <a:spLocks noGrp="1"/>
+          </p:cNvSpPr>
+          <p:nvPr>
+            <p:ph idx="1"/>
+          </p:nvPr>
+        </p:nvSpPr>
+        <p:spPr>
+          <a:xfrm>
+            <a:off x="372533" y="1394989"/>
+            <a:ext cx="5240865" cy="5022426"/>
+          </a:xfrm>
+        </p:spPr>
+        <p:txBody>
+          <a:bodyPr>
+            <a:noAutofit/>
+          </a:bodyPr>
+          <a:lstStyle/>
+          <a:p>
+            <a:pPr marL="0" indent="0">
+              <a:buNone/>
+            </a:pPr>
+            <a:endParaRPr lang="ru-RU" sz="2400" dirty="0"/>
+          </a:p>
+        </p:txBody>
+      </p:sp>
+    </p:spTree>
+    <p:extLst>
+      <p:ext uri="{BB962C8B-B14F-4D97-AF65-F5344CB8AC3E}">
+        <p14:creationId xmlns:p14="http://schemas.microsoft.com/office/powerpoint/2010/main" val="2137838600"/>
+      </p:ext>
+    </p:extLst>
+  </p:cSld>
+  <p:clrMapOvr>
+    <a:masterClrMapping/>
+  </p:clrMapOvr>
+</p:sld>
+</file>
+
+<file path=ppt/slides/slide11.xml><?xml version="1.0" encoding="utf-8"?>
+<p:sld xmlns:a="http://schemas.openxmlformats.org/drawingml/2006/main" xmlns:r="http://schemas.openxmlformats.org/officeDocument/2006/relationships" xmlns:p="http://schemas.openxmlformats.org/presentationml/2006/main">
+  <p:cSld>
+    <p:spTree>
+      <p:nvGrpSpPr>
+        <p:cNvPr id="1" name=""/>
+        <p:cNvGrpSpPr/>
+        <p:nvPr/>
+      </p:nvGrpSpPr>
+      <p:grpSpPr>
+        <a:xfrm>
+          <a:off x="0" y="0"/>
+          <a:ext cx="0" cy="0"/>
+          <a:chOff x="0" y="0"/>
+          <a:chExt cx="0" cy="0"/>
+        </a:xfrm>
+      </p:grpSpPr>
+      <p:sp>
+        <p:nvSpPr>
+          <p:cNvPr id="2" name="Заголовок 1">
+            <a:extLst>
+              <a:ext uri="{FF2B5EF4-FFF2-40B4-BE49-F238E27FC236}">
+                <a16:creationId xmlns:a16="http://schemas.microsoft.com/office/drawing/2014/main" id="{BAA9CF46-B519-4275-A267-75A74DE5D2A9}"/>
+              </a:ext>
+            </a:extLst>
+          </p:cNvPr>
+          <p:cNvSpPr>
+            <a:spLocks noGrp="1"/>
+          </p:cNvSpPr>
+          <p:nvPr>
+            <p:ph type="title"/>
+          </p:nvPr>
+        </p:nvSpPr>
+        <p:spPr>
+          <a:xfrm>
+            <a:off x="372533" y="0"/>
+            <a:ext cx="10888134" cy="1394989"/>
+          </a:xfrm>
+        </p:spPr>
+        <p:txBody>
+          <a:bodyPr>
+            <a:normAutofit fontScale="90000"/>
+          </a:bodyPr>
+          <a:lstStyle/>
+          <a:p>
+            <a:r>
+              <a:rPr lang="lv-LV" sz="5400" b="1" dirty="0">
+                <a:solidFill>
+                  <a:schemeClr val="accent1">
+                    <a:lumMod val="50000"/>
+                  </a:schemeClr>
+                </a:solidFill>
+              </a:rPr>
+              <a:t>Lietotāja ekspluatācijas instrukcija</a:t>
+            </a:r>
+          </a:p>
+        </p:txBody>
+      </p:sp>
+      <p:sp>
+        <p:nvSpPr>
+          <p:cNvPr id="3" name="Объект 2">
+            <a:extLst>
+              <a:ext uri="{FF2B5EF4-FFF2-40B4-BE49-F238E27FC236}">
+                <a16:creationId xmlns:a16="http://schemas.microsoft.com/office/drawing/2014/main" id="{C6D24479-1A15-455E-9662-E2A3D71266E7}"/>
+              </a:ext>
+            </a:extLst>
+          </p:cNvPr>
+          <p:cNvSpPr>
+            <a:spLocks noGrp="1"/>
+          </p:cNvSpPr>
+          <p:nvPr>
+            <p:ph idx="1"/>
+          </p:nvPr>
+        </p:nvSpPr>
+        <p:spPr>
+          <a:xfrm>
+            <a:off x="372533" y="1394989"/>
+            <a:ext cx="5240865" cy="5022426"/>
+          </a:xfrm>
+        </p:spPr>
+        <p:txBody>
+          <a:bodyPr>
+            <a:noAutofit/>
+          </a:bodyPr>
+          <a:lstStyle/>
+          <a:p>
+            <a:pPr marL="0" indent="0">
+              <a:buNone/>
+            </a:pPr>
+            <a:endParaRPr lang="ru-RU" sz="2400" dirty="0"/>
+          </a:p>
+        </p:txBody>
+      </p:sp>
+    </p:spTree>
+    <p:extLst>
+      <p:ext uri="{BB962C8B-B14F-4D97-AF65-F5344CB8AC3E}">
+        <p14:creationId xmlns:p14="http://schemas.microsoft.com/office/powerpoint/2010/main" val="427564509"/>
+      </p:ext>
+    </p:extLst>
+  </p:cSld>
+  <p:clrMapOvr>
+    <a:masterClrMapping/>
+  </p:clrMapOvr>
+</p:sld>
+</file>
+
+<file path=ppt/slides/slide12.xml><?xml version="1.0" encoding="utf-8"?>
+<p:sld xmlns:a="http://schemas.openxmlformats.org/drawingml/2006/main" xmlns:r="http://schemas.openxmlformats.org/officeDocument/2006/relationships" xmlns:p="http://schemas.openxmlformats.org/presentationml/2006/main">
+  <p:cSld>
+    <p:spTree>
+      <p:nvGrpSpPr>
+        <p:cNvPr id="1" name=""/>
+        <p:cNvGrpSpPr/>
+        <p:nvPr/>
+      </p:nvGrpSpPr>
+      <p:grpSpPr>
+        <a:xfrm>
+          <a:off x="0" y="0"/>
+          <a:ext cx="0" cy="0"/>
+          <a:chOff x="0" y="0"/>
+          <a:chExt cx="0" cy="0"/>
+        </a:xfrm>
+      </p:grpSpPr>
+      <p:sp>
+        <p:nvSpPr>
+          <p:cNvPr id="2" name="Заголовок 1">
+            <a:extLst>
+              <a:ext uri="{FF2B5EF4-FFF2-40B4-BE49-F238E27FC236}">
+                <a16:creationId xmlns:a16="http://schemas.microsoft.com/office/drawing/2014/main" id="{BAA9CF46-B519-4275-A267-75A74DE5D2A9}"/>
+              </a:ext>
+            </a:extLst>
+          </p:cNvPr>
+          <p:cNvSpPr>
+            <a:spLocks noGrp="1"/>
+          </p:cNvSpPr>
+          <p:nvPr>
+            <p:ph type="title"/>
+          </p:nvPr>
+        </p:nvSpPr>
+        <p:spPr>
+          <a:xfrm>
+            <a:off x="372533" y="0"/>
+            <a:ext cx="10888134" cy="1394989"/>
+          </a:xfrm>
+        </p:spPr>
+        <p:txBody>
+          <a:bodyPr>
+            <a:normAutofit/>
+          </a:bodyPr>
+          <a:lstStyle/>
+          <a:p>
+            <a:r>
+              <a:rPr lang="lv-LV" sz="5400" b="1" dirty="0">
+                <a:solidFill>
+                  <a:schemeClr val="accent1">
+                    <a:lumMod val="50000"/>
+                  </a:schemeClr>
+                </a:solidFill>
+              </a:rPr>
+              <a:t>Secinājumi</a:t>
+            </a:r>
+          </a:p>
+        </p:txBody>
+      </p:sp>
+      <p:sp>
+        <p:nvSpPr>
+          <p:cNvPr id="3" name="Объект 2">
+            <a:extLst>
+              <a:ext uri="{FF2B5EF4-FFF2-40B4-BE49-F238E27FC236}">
+                <a16:creationId xmlns:a16="http://schemas.microsoft.com/office/drawing/2014/main" id="{C6D24479-1A15-455E-9662-E2A3D71266E7}"/>
+              </a:ext>
+            </a:extLst>
+          </p:cNvPr>
+          <p:cNvSpPr>
+            <a:spLocks noGrp="1"/>
+          </p:cNvSpPr>
+          <p:nvPr>
+            <p:ph idx="1"/>
+          </p:nvPr>
+        </p:nvSpPr>
+        <p:spPr>
+          <a:xfrm>
+            <a:off x="372533" y="1394989"/>
+            <a:ext cx="5240865" cy="5022426"/>
+          </a:xfrm>
+        </p:spPr>
+        <p:txBody>
+          <a:bodyPr>
+            <a:noAutofit/>
+          </a:bodyPr>
+          <a:lstStyle/>
+          <a:p>
+            <a:pPr marL="0" indent="0">
+              <a:buNone/>
+            </a:pPr>
+            <a:endParaRPr lang="ru-RU" sz="2400" dirty="0"/>
+          </a:p>
+        </p:txBody>
+      </p:sp>
+    </p:spTree>
+    <p:extLst>
+      <p:ext uri="{BB962C8B-B14F-4D97-AF65-F5344CB8AC3E}">
+        <p14:creationId xmlns:p14="http://schemas.microsoft.com/office/powerpoint/2010/main" val="4161087356"/>
+      </p:ext>
+    </p:extLst>
+  </p:cSld>
+  <p:clrMapOvr>
+    <a:masterClrMapping/>
+  </p:clrMapOvr>
+</p:sld>
+</file>
+
+<file path=ppt/slides/slide13.xml><?xml version="1.0" encoding="utf-8"?>
+<p:sld xmlns:a="http://schemas.openxmlformats.org/drawingml/2006/main" xmlns:r="http://schemas.openxmlformats.org/officeDocument/2006/relationships" xmlns:p="http://schemas.openxmlformats.org/presentationml/2006/main">
+  <p:cSld>
+    <p:spTree>
+      <p:nvGrpSpPr>
+        <p:cNvPr id="1" name=""/>
+        <p:cNvGrpSpPr/>
+        <p:nvPr/>
+      </p:nvGrpSpPr>
+      <p:grpSpPr>
+        <a:xfrm>
+          <a:off x="0" y="0"/>
+          <a:ext cx="0" cy="0"/>
+          <a:chOff x="0" y="0"/>
+          <a:chExt cx="0" cy="0"/>
+        </a:xfrm>
+      </p:grpSpPr>
+      <p:sp>
+        <p:nvSpPr>
+          <p:cNvPr id="4" name="Заголовок 3">
+            <a:extLst>
+              <a:ext uri="{FF2B5EF4-FFF2-40B4-BE49-F238E27FC236}">
+                <a16:creationId xmlns:a16="http://schemas.microsoft.com/office/drawing/2014/main" id="{305F2BA2-D1F1-46D2-B7B9-C3F206C4D679}"/>
+              </a:ext>
+            </a:extLst>
+          </p:cNvPr>
+          <p:cNvSpPr>
+            <a:spLocks noGrp="1"/>
+          </p:cNvSpPr>
+          <p:nvPr>
+            <p:ph type="ctrTitle"/>
+          </p:nvPr>
+        </p:nvSpPr>
+        <p:spPr>
+          <a:xfrm>
+            <a:off x="939970" y="1430866"/>
+            <a:ext cx="10312061" cy="3996268"/>
+          </a:xfrm>
+        </p:spPr>
+        <p:txBody>
+          <a:bodyPr>
+            <a:noAutofit/>
+          </a:bodyPr>
+          <a:lstStyle/>
+          <a:p>
+            <a:r>
+              <a:rPr lang="lv-LV" sz="14900" dirty="0"/>
+              <a:t>Paldies par uzmanību!</a:t>
+            </a:r>
+            <a:endParaRPr lang="ru-RU" sz="14900" dirty="0"/>
+          </a:p>
+        </p:txBody>
+      </p:sp>
+    </p:spTree>
+    <p:extLst>
+      <p:ext uri="{BB962C8B-B14F-4D97-AF65-F5344CB8AC3E}">
+        <p14:creationId xmlns:p14="http://schemas.microsoft.com/office/powerpoint/2010/main" val="1748566630"/>
+      </p:ext>
+    </p:extLst>
+  </p:cSld>
+  <p:clrMapOvr>
+    <a:masterClrMapping/>
+  </p:clrMapOvr>
+</p:sld>
+</file>
+
 <file path=ppt/slides/slide2.xml><?xml version="1.0" encoding="utf-8"?>
 <p:sld xmlns:a="http://schemas.openxmlformats.org/drawingml/2006/main" xmlns:r="http://schemas.openxmlformats.org/officeDocument/2006/relationships" xmlns:p="http://schemas.openxmlformats.org/presentationml/2006/main">
   <p:cSld>
@@ -5311,6 +5702,7 @@
           </a:bodyPr>
           <a:lstStyle/>
           <a:p>
+            <a:pPr algn="ctr"/>
             <a:r>
               <a:rPr lang="lv-LV" sz="5400" b="1" dirty="0">
                 <a:solidFill>
@@ -5319,7 +5711,7 @@
                   </a:schemeClr>
                 </a:solidFill>
               </a:rPr>
-              <a:t>Klašu diagramma</a:t>
+              <a:t>Klašu diagrammas apraksts</a:t>
             </a:r>
           </a:p>
         </p:txBody>
@@ -5342,8 +5734,8 @@
         </p:nvSpPr>
         <p:spPr>
           <a:xfrm>
-            <a:off x="372533" y="1394989"/>
-            <a:ext cx="5240865" cy="5022426"/>
+            <a:off x="372533" y="1481667"/>
+            <a:ext cx="10058400" cy="4935748"/>
           </a:xfrm>
         </p:spPr>
         <p:txBody>
@@ -5355,7 +5747,130 @@
             <a:pPr marL="0" indent="0">
               <a:buNone/>
             </a:pPr>
-            <a:endParaRPr lang="ru-RU" sz="2400" dirty="0"/>
+            <a:r>
+              <a:rPr lang="lv-LV" sz="2400" dirty="0"/>
+              <a:t>Manas programmas klašu sistēma sastāv no klasēm:</a:t>
+            </a:r>
+          </a:p>
+          <a:p>
+            <a:pPr lvl="2">
+              <a:spcBef>
+                <a:spcPts val="0"/>
+              </a:spcBef>
+            </a:pPr>
+            <a:r>
+              <a:rPr lang="lv-LV" sz="2400" b="1" dirty="0">
+                <a:solidFill>
+                  <a:schemeClr val="tx2"/>
+                </a:solidFill>
+              </a:rPr>
+              <a:t>User</a:t>
+            </a:r>
+            <a:r>
+              <a:rPr lang="lv-LV" sz="2400" dirty="0">
+                <a:solidFill>
+                  <a:schemeClr val="tx1"/>
+                </a:solidFill>
+              </a:rPr>
+              <a:t> - klase, kas ļauj objektam pievienot jaunu lietotāju datus un piekļūt tiem nākotnē.</a:t>
+            </a:r>
+          </a:p>
+          <a:p>
+            <a:pPr lvl="2">
+              <a:spcBef>
+                <a:spcPts val="0"/>
+              </a:spcBef>
+            </a:pPr>
+            <a:r>
+              <a:rPr lang="lv-LV" sz="2400" b="1" dirty="0">
+                <a:solidFill>
+                  <a:schemeClr val="tx2"/>
+                </a:solidFill>
+              </a:rPr>
+              <a:t>Student</a:t>
+            </a:r>
+            <a:r>
+              <a:rPr lang="lv-LV" sz="2400" dirty="0">
+                <a:solidFill>
+                  <a:schemeClr val="tx1"/>
+                </a:solidFill>
+              </a:rPr>
+              <a:t> - klases User apakšklase, kas ļauj studentam redzēt savas atzīmes, veikt testus.</a:t>
+            </a:r>
+          </a:p>
+          <a:p>
+            <a:pPr lvl="2">
+              <a:spcBef>
+                <a:spcPts val="0"/>
+              </a:spcBef>
+            </a:pPr>
+            <a:r>
+              <a:rPr lang="lv-LV" sz="2400" b="1" dirty="0">
+                <a:solidFill>
+                  <a:schemeClr val="tx2"/>
+                </a:solidFill>
+              </a:rPr>
+              <a:t>Teacher</a:t>
+            </a:r>
+            <a:r>
+              <a:rPr lang="lv-LV" sz="2400" dirty="0">
+                <a:solidFill>
+                  <a:schemeClr val="tx1"/>
+                </a:solidFill>
+              </a:rPr>
+              <a:t> - lietotāja klases apakšklase, kas īsteno pārbaudes testu dzēšanas un izveides, atzīmju dzēšanas un maiņas, darba ar skolēnu sarakstu funkcijas.</a:t>
+            </a:r>
+          </a:p>
+          <a:p>
+            <a:pPr lvl="2">
+              <a:spcBef>
+                <a:spcPts val="0"/>
+              </a:spcBef>
+            </a:pPr>
+            <a:r>
+              <a:rPr lang="lv-LV" sz="2400" b="1" dirty="0">
+                <a:solidFill>
+                  <a:schemeClr val="tx2"/>
+                </a:solidFill>
+              </a:rPr>
+              <a:t>Test</a:t>
+            </a:r>
+            <a:r>
+              <a:rPr lang="lv-LV" sz="2400" dirty="0">
+                <a:solidFill>
+                  <a:schemeClr val="tx1"/>
+                </a:solidFill>
+              </a:rPr>
+              <a:t> - klase, kas īsteno testu saraksta un konkrēta testa apraksta izvades funkcijas.</a:t>
+            </a:r>
+          </a:p>
+          <a:p>
+            <a:pPr lvl="2">
+              <a:spcBef>
+                <a:spcPts val="0"/>
+              </a:spcBef>
+            </a:pPr>
+            <a:r>
+              <a:rPr lang="lv-LV" sz="2400" b="1" dirty="0">
+                <a:solidFill>
+                  <a:schemeClr val="tx2"/>
+                </a:solidFill>
+              </a:rPr>
+              <a:t>DataBase</a:t>
+            </a:r>
+            <a:r>
+              <a:rPr lang="lv-LV" sz="2400" dirty="0">
+                <a:solidFill>
+                  <a:schemeClr val="tx1"/>
+                </a:solidFill>
+              </a:rPr>
+              <a:t> - klase, ar kuras palīdzību tiek izveidots ātrs savienojums ar datu bāzi.</a:t>
+            </a:r>
+            <a:endParaRPr lang="ru-RU" sz="2400" dirty="0">
+              <a:solidFill>
+                <a:schemeClr val="tx1"/>
+              </a:solidFill>
+            </a:endParaRPr>
           </a:p>
         </p:txBody>
       </p:sp>
@@ -5413,6 +5928,106 @@
         </p:spPr>
         <p:txBody>
           <a:bodyPr>
+            <a:normAutofit/>
+          </a:bodyPr>
+          <a:lstStyle/>
+          <a:p>
+            <a:pPr algn="ctr"/>
+            <a:r>
+              <a:rPr lang="lv-LV" sz="5400" b="1" dirty="0">
+                <a:solidFill>
+                  <a:schemeClr val="accent1">
+                    <a:lumMod val="50000"/>
+                  </a:schemeClr>
+                </a:solidFill>
+              </a:rPr>
+              <a:t>Klašu diagramma</a:t>
+            </a:r>
+          </a:p>
+        </p:txBody>
+      </p:sp>
+      <p:pic>
+        <p:nvPicPr>
+          <p:cNvPr id="6" name="Рисунок 5">
+            <a:extLst>
+              <a:ext uri="{FF2B5EF4-FFF2-40B4-BE49-F238E27FC236}">
+                <a16:creationId xmlns:a16="http://schemas.microsoft.com/office/drawing/2014/main" id="{B1981384-C643-4EFE-9028-A2AA90B388D8}"/>
+              </a:ext>
+            </a:extLst>
+          </p:cNvPr>
+          <p:cNvPicPr/>
+          <p:nvPr/>
+        </p:nvPicPr>
+        <p:blipFill>
+          <a:blip r:embed="rId2"/>
+          <a:stretch>
+            <a:fillRect/>
+          </a:stretch>
+        </p:blipFill>
+        <p:spPr>
+          <a:xfrm>
+            <a:off x="257810" y="1667934"/>
+            <a:ext cx="10792656" cy="4177770"/>
+          </a:xfrm>
+          <a:prstGeom prst="rect">
+            <a:avLst/>
+          </a:prstGeom>
+        </p:spPr>
+      </p:pic>
+    </p:spTree>
+    <p:extLst>
+      <p:ext uri="{BB962C8B-B14F-4D97-AF65-F5344CB8AC3E}">
+        <p14:creationId xmlns:p14="http://schemas.microsoft.com/office/powerpoint/2010/main" val="1388574825"/>
+      </p:ext>
+    </p:extLst>
+  </p:cSld>
+  <p:clrMapOvr>
+    <a:masterClrMapping/>
+  </p:clrMapOvr>
+</p:sld>
+</file>
+
+<file path=ppt/slides/slide7.xml><?xml version="1.0" encoding="utf-8"?>
+<p:sld xmlns:a="http://schemas.openxmlformats.org/drawingml/2006/main" xmlns:r="http://schemas.openxmlformats.org/officeDocument/2006/relationships" xmlns:p="http://schemas.openxmlformats.org/presentationml/2006/main">
+  <p:cSld>
+    <p:spTree>
+      <p:nvGrpSpPr>
+        <p:cNvPr id="1" name=""/>
+        <p:cNvGrpSpPr/>
+        <p:nvPr/>
+      </p:nvGrpSpPr>
+      <p:grpSpPr>
+        <a:xfrm>
+          <a:off x="0" y="0"/>
+          <a:ext cx="0" cy="0"/>
+          <a:chOff x="0" y="0"/>
+          <a:chExt cx="0" cy="0"/>
+        </a:xfrm>
+      </p:grpSpPr>
+      <p:sp>
+        <p:nvSpPr>
+          <p:cNvPr id="2" name="Заголовок 1">
+            <a:extLst>
+              <a:ext uri="{FF2B5EF4-FFF2-40B4-BE49-F238E27FC236}">
+                <a16:creationId xmlns:a16="http://schemas.microsoft.com/office/drawing/2014/main" id="{BAA9CF46-B519-4275-A267-75A74DE5D2A9}"/>
+              </a:ext>
+            </a:extLst>
+          </p:cNvPr>
+          <p:cNvSpPr>
+            <a:spLocks noGrp="1"/>
+          </p:cNvSpPr>
+          <p:nvPr>
+            <p:ph type="title"/>
+          </p:nvPr>
+        </p:nvSpPr>
+        <p:spPr>
+          <a:xfrm>
+            <a:off x="372533" y="0"/>
+            <a:ext cx="10888134" cy="1394989"/>
+          </a:xfrm>
+        </p:spPr>
+        <p:txBody>
+          <a:bodyPr>
             <a:normAutofit fontScale="90000"/>
           </a:bodyPr>
           <a:lstStyle/>
@@ -5478,18 +6093,230 @@
 </p:sld>
 </file>
 
+<file path=ppt/slides/slide8.xml><?xml version="1.0" encoding="utf-8"?>
+<p:sld xmlns:a="http://schemas.openxmlformats.org/drawingml/2006/main" xmlns:r="http://schemas.openxmlformats.org/officeDocument/2006/relationships" xmlns:p="http://schemas.openxmlformats.org/presentationml/2006/main">
+  <p:cSld>
+    <p:spTree>
+      <p:nvGrpSpPr>
+        <p:cNvPr id="1" name=""/>
+        <p:cNvGrpSpPr/>
+        <p:nvPr/>
+      </p:nvGrpSpPr>
+      <p:grpSpPr>
+        <a:xfrm>
+          <a:off x="0" y="0"/>
+          <a:ext cx="0" cy="0"/>
+          <a:chOff x="0" y="0"/>
+          <a:chExt cx="0" cy="0"/>
+        </a:xfrm>
+      </p:grpSpPr>
+      <p:sp>
+        <p:nvSpPr>
+          <p:cNvPr id="2" name="Заголовок 1">
+            <a:extLst>
+              <a:ext uri="{FF2B5EF4-FFF2-40B4-BE49-F238E27FC236}">
+                <a16:creationId xmlns:a16="http://schemas.microsoft.com/office/drawing/2014/main" id="{BAA9CF46-B519-4275-A267-75A74DE5D2A9}"/>
+              </a:ext>
+            </a:extLst>
+          </p:cNvPr>
+          <p:cNvSpPr>
+            <a:spLocks noGrp="1"/>
+          </p:cNvSpPr>
+          <p:nvPr>
+            <p:ph type="title"/>
+          </p:nvPr>
+        </p:nvSpPr>
+        <p:spPr>
+          <a:xfrm>
+            <a:off x="372533" y="0"/>
+            <a:ext cx="10888134" cy="1394989"/>
+          </a:xfrm>
+        </p:spPr>
+        <p:txBody>
+          <a:bodyPr>
+            <a:normAutofit fontScale="90000"/>
+          </a:bodyPr>
+          <a:lstStyle/>
+          <a:p>
+            <a:r>
+              <a:rPr lang="lv-LV" sz="5400" b="1" dirty="0">
+                <a:solidFill>
+                  <a:schemeClr val="accent1">
+                    <a:lumMod val="50000"/>
+                  </a:schemeClr>
+                </a:solidFill>
+              </a:rPr>
+              <a:t>Galveno metožu algoritmu apraksts</a:t>
+            </a:r>
+          </a:p>
+        </p:txBody>
+      </p:sp>
+      <p:sp>
+        <p:nvSpPr>
+          <p:cNvPr id="3" name="Объект 2">
+            <a:extLst>
+              <a:ext uri="{FF2B5EF4-FFF2-40B4-BE49-F238E27FC236}">
+                <a16:creationId xmlns:a16="http://schemas.microsoft.com/office/drawing/2014/main" id="{C6D24479-1A15-455E-9662-E2A3D71266E7}"/>
+              </a:ext>
+            </a:extLst>
+          </p:cNvPr>
+          <p:cNvSpPr>
+            <a:spLocks noGrp="1"/>
+          </p:cNvSpPr>
+          <p:nvPr>
+            <p:ph idx="1"/>
+          </p:nvPr>
+        </p:nvSpPr>
+        <p:spPr>
+          <a:xfrm>
+            <a:off x="372533" y="1394989"/>
+            <a:ext cx="5240865" cy="5022426"/>
+          </a:xfrm>
+        </p:spPr>
+        <p:txBody>
+          <a:bodyPr>
+            <a:noAutofit/>
+          </a:bodyPr>
+          <a:lstStyle/>
+          <a:p>
+            <a:pPr marL="0" indent="0">
+              <a:buNone/>
+            </a:pPr>
+            <a:endParaRPr lang="ru-RU" sz="2400" dirty="0"/>
+          </a:p>
+        </p:txBody>
+      </p:sp>
+    </p:spTree>
+    <p:extLst>
+      <p:ext uri="{BB962C8B-B14F-4D97-AF65-F5344CB8AC3E}">
+        <p14:creationId xmlns:p14="http://schemas.microsoft.com/office/powerpoint/2010/main" val="1095090930"/>
+      </p:ext>
+    </p:extLst>
+  </p:cSld>
+  <p:clrMapOvr>
+    <a:masterClrMapping/>
+  </p:clrMapOvr>
+</p:sld>
+</file>
+
+<file path=ppt/slides/slide9.xml><?xml version="1.0" encoding="utf-8"?>
+<p:sld xmlns:a="http://schemas.openxmlformats.org/drawingml/2006/main" xmlns:r="http://schemas.openxmlformats.org/officeDocument/2006/relationships" xmlns:p="http://schemas.openxmlformats.org/presentationml/2006/main">
+  <p:cSld>
+    <p:spTree>
+      <p:nvGrpSpPr>
+        <p:cNvPr id="1" name=""/>
+        <p:cNvGrpSpPr/>
+        <p:nvPr/>
+      </p:nvGrpSpPr>
+      <p:grpSpPr>
+        <a:xfrm>
+          <a:off x="0" y="0"/>
+          <a:ext cx="0" cy="0"/>
+          <a:chOff x="0" y="0"/>
+          <a:chExt cx="0" cy="0"/>
+        </a:xfrm>
+      </p:grpSpPr>
+      <p:sp>
+        <p:nvSpPr>
+          <p:cNvPr id="2" name="Заголовок 1">
+            <a:extLst>
+              <a:ext uri="{FF2B5EF4-FFF2-40B4-BE49-F238E27FC236}">
+                <a16:creationId xmlns:a16="http://schemas.microsoft.com/office/drawing/2014/main" id="{BAA9CF46-B519-4275-A267-75A74DE5D2A9}"/>
+              </a:ext>
+            </a:extLst>
+          </p:cNvPr>
+          <p:cNvSpPr>
+            <a:spLocks noGrp="1"/>
+          </p:cNvSpPr>
+          <p:nvPr>
+            <p:ph type="title"/>
+          </p:nvPr>
+        </p:nvSpPr>
+        <p:spPr>
+          <a:xfrm>
+            <a:off x="372533" y="0"/>
+            <a:ext cx="10888134" cy="1394989"/>
+          </a:xfrm>
+        </p:spPr>
+        <p:txBody>
+          <a:bodyPr>
+            <a:normAutofit/>
+          </a:bodyPr>
+          <a:lstStyle/>
+          <a:p>
+            <a:r>
+              <a:rPr lang="lv-LV" sz="5400" b="1" dirty="0">
+                <a:solidFill>
+                  <a:schemeClr val="accent1">
+                    <a:lumMod val="50000"/>
+                  </a:schemeClr>
+                </a:solidFill>
+              </a:rPr>
+              <a:t>Testēšanas metodikas</a:t>
+            </a:r>
+          </a:p>
+        </p:txBody>
+      </p:sp>
+      <p:sp>
+        <p:nvSpPr>
+          <p:cNvPr id="3" name="Объект 2">
+            <a:extLst>
+              <a:ext uri="{FF2B5EF4-FFF2-40B4-BE49-F238E27FC236}">
+                <a16:creationId xmlns:a16="http://schemas.microsoft.com/office/drawing/2014/main" id="{C6D24479-1A15-455E-9662-E2A3D71266E7}"/>
+              </a:ext>
+            </a:extLst>
+          </p:cNvPr>
+          <p:cNvSpPr>
+            <a:spLocks noGrp="1"/>
+          </p:cNvSpPr>
+          <p:nvPr>
+            <p:ph idx="1"/>
+          </p:nvPr>
+        </p:nvSpPr>
+        <p:spPr>
+          <a:xfrm>
+            <a:off x="372533" y="1394989"/>
+            <a:ext cx="5240865" cy="5022426"/>
+          </a:xfrm>
+        </p:spPr>
+        <p:txBody>
+          <a:bodyPr>
+            <a:noAutofit/>
+          </a:bodyPr>
+          <a:lstStyle/>
+          <a:p>
+            <a:pPr marL="0" indent="0">
+              <a:buNone/>
+            </a:pPr>
+            <a:endParaRPr lang="ru-RU" sz="2400" dirty="0"/>
+          </a:p>
+        </p:txBody>
+      </p:sp>
+    </p:spTree>
+    <p:extLst>
+      <p:ext uri="{BB962C8B-B14F-4D97-AF65-F5344CB8AC3E}">
+        <p14:creationId xmlns:p14="http://schemas.microsoft.com/office/powerpoint/2010/main" val="3714643187"/>
+      </p:ext>
+    </p:extLst>
+  </p:cSld>
+  <p:clrMapOvr>
+    <a:masterClrMapping/>
+  </p:clrMapOvr>
+</p:sld>
+</file>
+
 <file path=ppt/theme/theme1.xml><?xml version="1.0" encoding="utf-8"?>
 <a:theme xmlns:a="http://schemas.openxmlformats.org/drawingml/2006/main" name="Вид">
   <a:themeElements>
-    <a:clrScheme name="Зеленый">
+    <a:clrScheme name="Другая 7">
       <a:dk1>
-        <a:sysClr val="windowText" lastClr="000000"/>
+        <a:srgbClr val="000000"/>
       </a:dk1>
       <a:lt1>
         <a:sysClr val="window" lastClr="FFFFFF"/>
       </a:lt1>
       <a:dk2>
-        <a:srgbClr val="455F51"/>
+        <a:srgbClr val="2A4F1C"/>
       </a:dk2>
       <a:lt2>
         <a:srgbClr val="E3DED1"/>

</xml_diff>